<commit_message>
Updated the about page
</commit_message>
<xml_diff>
--- a/tooldemopres.pptx
+++ b/tooldemopres.pptx
@@ -118,6 +118,22 @@
       </a:defRPr>
     </a:lvl9pPr>
   </p:defaultTextStyle>
+  <p:extLst>
+    <p:ext uri="{EFAFB233-063F-42B5-8137-9DF3F51BA10A}">
+      <p15:sldGuideLst xmlns:p15="http://schemas.microsoft.com/office/powerpoint/2012/main">
+        <p15:guide id="1" orient="horz" pos="2160">
+          <p15:clr>
+            <a:srgbClr val="A4A3A4"/>
+          </p15:clr>
+        </p15:guide>
+        <p15:guide id="2" pos="2880">
+          <p15:clr>
+            <a:srgbClr val="A4A3A4"/>
+          </p15:clr>
+        </p15:guide>
+      </p15:sldGuideLst>
+    </p:ext>
+  </p:extLst>
 </p:presentation>
 </file>
 
@@ -168,10 +184,9 @@
           </a:lstStyle>
           <a:p>
             <a:r>
-              <a:rPr kumimoji="0" lang="en-US" smtClean="0"/>
+              <a:rPr kumimoji="0" lang="en-US"/>
               <a:t>Click to edit Master title style</a:t>
             </a:r>
-            <a:endParaRPr kumimoji="0" lang="en-US"/>
           </a:p>
         </p:txBody>
       </p:sp>
@@ -229,10 +244,9 @@
           </a:lstStyle>
           <a:p>
             <a:r>
-              <a:rPr kumimoji="0" lang="en-US" smtClean="0"/>
+              <a:rPr kumimoji="0" lang="en-US"/>
               <a:t>Click to edit Master subtitle style</a:t>
             </a:r>
-            <a:endParaRPr kumimoji="0" lang="en-US"/>
           </a:p>
         </p:txBody>
       </p:sp>
@@ -259,7 +273,7 @@
             <a:fld id="{1D8BD707-D9CF-40AE-B4C6-C98DA3205C09}" type="datetimeFigureOut">
               <a:rPr lang="en-US" smtClean="0"/>
               <a:pPr/>
-              <a:t>4/22/2017</a:t>
+              <a:t>4/23/2017</a:t>
             </a:fld>
             <a:endParaRPr lang="en-US"/>
           </a:p>
@@ -1053,10 +1067,9 @@
           <a:lstStyle/>
           <a:p>
             <a:r>
-              <a:rPr kumimoji="0" lang="en-US" smtClean="0"/>
+              <a:rPr kumimoji="0" lang="en-US"/>
               <a:t>Click to edit Master title style</a:t>
             </a:r>
-            <a:endParaRPr kumimoji="0" lang="en-US"/>
           </a:p>
         </p:txBody>
       </p:sp>
@@ -1077,35 +1090,35 @@
           <a:p>
             <a:pPr lvl="0" eaLnBrk="1" latinLnBrk="0" hangingPunct="1"/>
             <a:r>
-              <a:rPr lang="en-US" smtClean="0"/>
+              <a:rPr lang="en-US"/>
               <a:t>Click to edit Master text styles</a:t>
             </a:r>
           </a:p>
           <a:p>
             <a:pPr lvl="1" eaLnBrk="1" latinLnBrk="0" hangingPunct="1"/>
             <a:r>
-              <a:rPr lang="en-US" smtClean="0"/>
+              <a:rPr lang="en-US"/>
               <a:t>Second level</a:t>
             </a:r>
           </a:p>
           <a:p>
             <a:pPr lvl="2" eaLnBrk="1" latinLnBrk="0" hangingPunct="1"/>
             <a:r>
-              <a:rPr lang="en-US" smtClean="0"/>
+              <a:rPr lang="en-US"/>
               <a:t>Third level</a:t>
             </a:r>
           </a:p>
           <a:p>
             <a:pPr lvl="3" eaLnBrk="1" latinLnBrk="0" hangingPunct="1"/>
             <a:r>
-              <a:rPr lang="en-US" smtClean="0"/>
+              <a:rPr lang="en-US"/>
               <a:t>Fourth level</a:t>
             </a:r>
           </a:p>
           <a:p>
             <a:pPr lvl="4" eaLnBrk="1" latinLnBrk="0" hangingPunct="1"/>
             <a:r>
-              <a:rPr lang="en-US" smtClean="0"/>
+              <a:rPr lang="en-US"/>
               <a:t>Fifth level</a:t>
             </a:r>
             <a:endParaRPr kumimoji="0" lang="en-US"/>
@@ -1130,7 +1143,7 @@
             <a:fld id="{1D8BD707-D9CF-40AE-B4C6-C98DA3205C09}" type="datetimeFigureOut">
               <a:rPr lang="en-US" smtClean="0"/>
               <a:pPr/>
-              <a:t>4/22/2017</a:t>
+              <a:t>4/23/2017</a:t>
             </a:fld>
             <a:endParaRPr lang="en-US"/>
           </a:p>
@@ -1225,10 +1238,9 @@
           <a:lstStyle/>
           <a:p>
             <a:r>
-              <a:rPr kumimoji="0" lang="en-US" smtClean="0"/>
+              <a:rPr kumimoji="0" lang="en-US"/>
               <a:t>Click to edit Master title style</a:t>
             </a:r>
-            <a:endParaRPr kumimoji="0" lang="en-US"/>
           </a:p>
         </p:txBody>
       </p:sp>
@@ -1254,35 +1266,35 @@
           <a:p>
             <a:pPr lvl="0" eaLnBrk="1" latinLnBrk="0" hangingPunct="1"/>
             <a:r>
-              <a:rPr lang="en-US" smtClean="0"/>
+              <a:rPr lang="en-US"/>
               <a:t>Click to edit Master text styles</a:t>
             </a:r>
           </a:p>
           <a:p>
             <a:pPr lvl="1" eaLnBrk="1" latinLnBrk="0" hangingPunct="1"/>
             <a:r>
-              <a:rPr lang="en-US" smtClean="0"/>
+              <a:rPr lang="en-US"/>
               <a:t>Second level</a:t>
             </a:r>
           </a:p>
           <a:p>
             <a:pPr lvl="2" eaLnBrk="1" latinLnBrk="0" hangingPunct="1"/>
             <a:r>
-              <a:rPr lang="en-US" smtClean="0"/>
+              <a:rPr lang="en-US"/>
               <a:t>Third level</a:t>
             </a:r>
           </a:p>
           <a:p>
             <a:pPr lvl="3" eaLnBrk="1" latinLnBrk="0" hangingPunct="1"/>
             <a:r>
-              <a:rPr lang="en-US" smtClean="0"/>
+              <a:rPr lang="en-US"/>
               <a:t>Fourth level</a:t>
             </a:r>
           </a:p>
           <a:p>
             <a:pPr lvl="4" eaLnBrk="1" latinLnBrk="0" hangingPunct="1"/>
             <a:r>
-              <a:rPr lang="en-US" smtClean="0"/>
+              <a:rPr lang="en-US"/>
               <a:t>Fifth level</a:t>
             </a:r>
             <a:endParaRPr kumimoji="0" lang="en-US"/>
@@ -1307,7 +1319,7 @@
             <a:fld id="{1D8BD707-D9CF-40AE-B4C6-C98DA3205C09}" type="datetimeFigureOut">
               <a:rPr lang="en-US" smtClean="0"/>
               <a:pPr/>
-              <a:t>4/22/2017</a:t>
+              <a:t>4/23/2017</a:t>
             </a:fld>
             <a:endParaRPr lang="en-US"/>
           </a:p>
@@ -1397,10 +1409,9 @@
           <a:lstStyle/>
           <a:p>
             <a:r>
-              <a:rPr kumimoji="0" lang="en-US" smtClean="0"/>
+              <a:rPr kumimoji="0" lang="en-US"/>
               <a:t>Click to edit Master title style</a:t>
             </a:r>
-            <a:endParaRPr kumimoji="0" lang="en-US"/>
           </a:p>
         </p:txBody>
       </p:sp>
@@ -1426,35 +1437,35 @@
           <a:p>
             <a:pPr lvl="0" eaLnBrk="1" latinLnBrk="0" hangingPunct="1"/>
             <a:r>
-              <a:rPr lang="en-US" smtClean="0"/>
+              <a:rPr lang="en-US"/>
               <a:t>Click to edit Master text styles</a:t>
             </a:r>
           </a:p>
           <a:p>
             <a:pPr lvl="1" eaLnBrk="1" latinLnBrk="0" hangingPunct="1"/>
             <a:r>
-              <a:rPr lang="en-US" smtClean="0"/>
+              <a:rPr lang="en-US"/>
               <a:t>Second level</a:t>
             </a:r>
           </a:p>
           <a:p>
             <a:pPr lvl="2" eaLnBrk="1" latinLnBrk="0" hangingPunct="1"/>
             <a:r>
-              <a:rPr lang="en-US" smtClean="0"/>
+              <a:rPr lang="en-US"/>
               <a:t>Third level</a:t>
             </a:r>
           </a:p>
           <a:p>
             <a:pPr lvl="3" eaLnBrk="1" latinLnBrk="0" hangingPunct="1"/>
             <a:r>
-              <a:rPr lang="en-US" smtClean="0"/>
+              <a:rPr lang="en-US"/>
               <a:t>Fourth level</a:t>
             </a:r>
           </a:p>
           <a:p>
             <a:pPr lvl="4" eaLnBrk="1" latinLnBrk="0" hangingPunct="1"/>
             <a:r>
-              <a:rPr lang="en-US" smtClean="0"/>
+              <a:rPr lang="en-US"/>
               <a:t>Fifth level</a:t>
             </a:r>
             <a:endParaRPr kumimoji="0" lang="en-US"/>
@@ -1479,7 +1490,7 @@
             <a:fld id="{1D8BD707-D9CF-40AE-B4C6-C98DA3205C09}" type="datetimeFigureOut">
               <a:rPr lang="en-US" smtClean="0"/>
               <a:pPr/>
-              <a:t>4/22/2017</a:t>
+              <a:t>4/23/2017</a:t>
             </a:fld>
             <a:endParaRPr lang="en-US"/>
           </a:p>
@@ -1584,10 +1595,9 @@
           </a:lstStyle>
           <a:p>
             <a:r>
-              <a:rPr kumimoji="0" lang="en-US" smtClean="0"/>
+              <a:rPr kumimoji="0" lang="en-US"/>
               <a:t>Click to edit Master title style</a:t>
             </a:r>
-            <a:endParaRPr kumimoji="0" lang="en-US"/>
           </a:p>
         </p:txBody>
       </p:sp>
@@ -1662,7 +1672,7 @@
           <a:p>
             <a:pPr lvl="0" eaLnBrk="1" latinLnBrk="0" hangingPunct="1"/>
             <a:r>
-              <a:rPr kumimoji="0" lang="en-US" smtClean="0"/>
+              <a:rPr kumimoji="0" lang="en-US"/>
               <a:t>Click to edit Master text styles</a:t>
             </a:r>
           </a:p>
@@ -1691,7 +1701,7 @@
             <a:fld id="{1D8BD707-D9CF-40AE-B4C6-C98DA3205C09}" type="datetimeFigureOut">
               <a:rPr lang="en-US" smtClean="0"/>
               <a:pPr/>
-              <a:t>4/22/2017</a:t>
+              <a:t>4/23/2017</a:t>
             </a:fld>
             <a:endParaRPr lang="en-US"/>
           </a:p>
@@ -2482,10 +2492,9 @@
           <a:lstStyle/>
           <a:p>
             <a:r>
-              <a:rPr kumimoji="0" lang="en-US" smtClean="0"/>
+              <a:rPr kumimoji="0" lang="en-US"/>
               <a:t>Click to edit Master title style</a:t>
             </a:r>
-            <a:endParaRPr kumimoji="0" lang="en-US"/>
           </a:p>
         </p:txBody>
       </p:sp>
@@ -2507,7 +2516,7 @@
             <a:fld id="{1D8BD707-D9CF-40AE-B4C6-C98DA3205C09}" type="datetimeFigureOut">
               <a:rPr lang="en-US" smtClean="0"/>
               <a:pPr/>
-              <a:t>4/22/2017</a:t>
+              <a:t>4/23/2017</a:t>
             </a:fld>
             <a:endParaRPr lang="en-US"/>
           </a:p>
@@ -2578,35 +2587,35 @@
           <a:p>
             <a:pPr lvl="0" eaLnBrk="1" latinLnBrk="0" hangingPunct="1"/>
             <a:r>
-              <a:rPr lang="en-US" smtClean="0"/>
+              <a:rPr lang="en-US"/>
               <a:t>Click to edit Master text styles</a:t>
             </a:r>
           </a:p>
           <a:p>
             <a:pPr lvl="1" eaLnBrk="1" latinLnBrk="0" hangingPunct="1"/>
             <a:r>
-              <a:rPr lang="en-US" smtClean="0"/>
+              <a:rPr lang="en-US"/>
               <a:t>Second level</a:t>
             </a:r>
           </a:p>
           <a:p>
             <a:pPr lvl="2" eaLnBrk="1" latinLnBrk="0" hangingPunct="1"/>
             <a:r>
-              <a:rPr lang="en-US" smtClean="0"/>
+              <a:rPr lang="en-US"/>
               <a:t>Third level</a:t>
             </a:r>
           </a:p>
           <a:p>
             <a:pPr lvl="3" eaLnBrk="1" latinLnBrk="0" hangingPunct="1"/>
             <a:r>
-              <a:rPr lang="en-US" smtClean="0"/>
+              <a:rPr lang="en-US"/>
               <a:t>Fourth level</a:t>
             </a:r>
           </a:p>
           <a:p>
             <a:pPr lvl="4" eaLnBrk="1" latinLnBrk="0" hangingPunct="1"/>
             <a:r>
-              <a:rPr lang="en-US" smtClean="0"/>
+              <a:rPr lang="en-US"/>
               <a:t>Fifth level</a:t>
             </a:r>
             <a:endParaRPr kumimoji="0" lang="en-US"/>
@@ -2635,35 +2644,35 @@
           <a:p>
             <a:pPr lvl="0" eaLnBrk="1" latinLnBrk="0" hangingPunct="1"/>
             <a:r>
-              <a:rPr lang="en-US" smtClean="0"/>
+              <a:rPr lang="en-US"/>
               <a:t>Click to edit Master text styles</a:t>
             </a:r>
           </a:p>
           <a:p>
             <a:pPr lvl="1" eaLnBrk="1" latinLnBrk="0" hangingPunct="1"/>
             <a:r>
-              <a:rPr lang="en-US" smtClean="0"/>
+              <a:rPr lang="en-US"/>
               <a:t>Second level</a:t>
             </a:r>
           </a:p>
           <a:p>
             <a:pPr lvl="2" eaLnBrk="1" latinLnBrk="0" hangingPunct="1"/>
             <a:r>
-              <a:rPr lang="en-US" smtClean="0"/>
+              <a:rPr lang="en-US"/>
               <a:t>Third level</a:t>
             </a:r>
           </a:p>
           <a:p>
             <a:pPr lvl="3" eaLnBrk="1" latinLnBrk="0" hangingPunct="1"/>
             <a:r>
-              <a:rPr lang="en-US" smtClean="0"/>
+              <a:rPr lang="en-US"/>
               <a:t>Fourth level</a:t>
             </a:r>
           </a:p>
           <a:p>
             <a:pPr lvl="4" eaLnBrk="1" latinLnBrk="0" hangingPunct="1"/>
             <a:r>
-              <a:rPr lang="en-US" smtClean="0"/>
+              <a:rPr lang="en-US"/>
               <a:t>Fifth level</a:t>
             </a:r>
             <a:endParaRPr kumimoji="0" lang="en-US"/>
@@ -2720,10 +2729,9 @@
           </a:lstStyle>
           <a:p>
             <a:r>
-              <a:rPr kumimoji="0" lang="en-US" smtClean="0"/>
+              <a:rPr kumimoji="0" lang="en-US"/>
               <a:t>Click to edit Master title style</a:t>
             </a:r>
-            <a:endParaRPr kumimoji="0" lang="en-US"/>
           </a:p>
         </p:txBody>
       </p:sp>
@@ -2745,7 +2753,7 @@
             <a:fld id="{1D8BD707-D9CF-40AE-B4C6-C98DA3205C09}" type="datetimeFigureOut">
               <a:rPr lang="en-US" smtClean="0"/>
               <a:pPr/>
-              <a:t>4/22/2017</a:t>
+              <a:t>4/23/2017</a:t>
             </a:fld>
             <a:endParaRPr lang="en-US"/>
           </a:p>
@@ -2816,35 +2824,35 @@
           <a:p>
             <a:pPr lvl="0" eaLnBrk="1" latinLnBrk="0" hangingPunct="1"/>
             <a:r>
-              <a:rPr lang="en-US" smtClean="0"/>
+              <a:rPr lang="en-US"/>
               <a:t>Click to edit Master text styles</a:t>
             </a:r>
           </a:p>
           <a:p>
             <a:pPr lvl="1" eaLnBrk="1" latinLnBrk="0" hangingPunct="1"/>
             <a:r>
-              <a:rPr lang="en-US" smtClean="0"/>
+              <a:rPr lang="en-US"/>
               <a:t>Second level</a:t>
             </a:r>
           </a:p>
           <a:p>
             <a:pPr lvl="2" eaLnBrk="1" latinLnBrk="0" hangingPunct="1"/>
             <a:r>
-              <a:rPr lang="en-US" smtClean="0"/>
+              <a:rPr lang="en-US"/>
               <a:t>Third level</a:t>
             </a:r>
           </a:p>
           <a:p>
             <a:pPr lvl="3" eaLnBrk="1" latinLnBrk="0" hangingPunct="1"/>
             <a:r>
-              <a:rPr lang="en-US" smtClean="0"/>
+              <a:rPr lang="en-US"/>
               <a:t>Fourth level</a:t>
             </a:r>
           </a:p>
           <a:p>
             <a:pPr lvl="4" eaLnBrk="1" latinLnBrk="0" hangingPunct="1"/>
             <a:r>
-              <a:rPr lang="en-US" smtClean="0"/>
+              <a:rPr lang="en-US"/>
               <a:t>Fifth level</a:t>
             </a:r>
             <a:endParaRPr kumimoji="0" lang="en-US"/>
@@ -2873,35 +2881,35 @@
           <a:p>
             <a:pPr lvl="0" eaLnBrk="1" latinLnBrk="0" hangingPunct="1"/>
             <a:r>
-              <a:rPr lang="en-US" smtClean="0"/>
+              <a:rPr lang="en-US"/>
               <a:t>Click to edit Master text styles</a:t>
             </a:r>
           </a:p>
           <a:p>
             <a:pPr lvl="1" eaLnBrk="1" latinLnBrk="0" hangingPunct="1"/>
             <a:r>
-              <a:rPr lang="en-US" smtClean="0"/>
+              <a:rPr lang="en-US"/>
               <a:t>Second level</a:t>
             </a:r>
           </a:p>
           <a:p>
             <a:pPr lvl="2" eaLnBrk="1" latinLnBrk="0" hangingPunct="1"/>
             <a:r>
-              <a:rPr lang="en-US" smtClean="0"/>
+              <a:rPr lang="en-US"/>
               <a:t>Third level</a:t>
             </a:r>
           </a:p>
           <a:p>
             <a:pPr lvl="3" eaLnBrk="1" latinLnBrk="0" hangingPunct="1"/>
             <a:r>
-              <a:rPr lang="en-US" smtClean="0"/>
+              <a:rPr lang="en-US"/>
               <a:t>Fourth level</a:t>
             </a:r>
           </a:p>
           <a:p>
             <a:pPr lvl="4" eaLnBrk="1" latinLnBrk="0" hangingPunct="1"/>
             <a:r>
-              <a:rPr lang="en-US" smtClean="0"/>
+              <a:rPr lang="en-US"/>
               <a:t>Fifth level</a:t>
             </a:r>
             <a:endParaRPr kumimoji="0" lang="en-US"/>
@@ -2950,7 +2958,7 @@
           <a:p>
             <a:pPr lvl="0" eaLnBrk="1" latinLnBrk="0" hangingPunct="1"/>
             <a:r>
-              <a:rPr kumimoji="0" lang="en-US" smtClean="0"/>
+              <a:rPr kumimoji="0" lang="en-US"/>
               <a:t>Click to edit Master text styles</a:t>
             </a:r>
           </a:p>
@@ -2998,7 +3006,7 @@
           <a:p>
             <a:pPr lvl="0" eaLnBrk="1" latinLnBrk="0" hangingPunct="1"/>
             <a:r>
-              <a:rPr kumimoji="0" lang="en-US" smtClean="0"/>
+              <a:rPr kumimoji="0" lang="en-US"/>
               <a:t>Click to edit Master text styles</a:t>
             </a:r>
           </a:p>
@@ -3045,10 +3053,9 @@
           <a:lstStyle/>
           <a:p>
             <a:r>
-              <a:rPr kumimoji="0" lang="en-US" smtClean="0"/>
+              <a:rPr kumimoji="0" lang="en-US"/>
               <a:t>Click to edit Master title style</a:t>
             </a:r>
-            <a:endParaRPr kumimoji="0" lang="en-US"/>
           </a:p>
         </p:txBody>
       </p:sp>
@@ -3070,7 +3077,7 @@
             <a:fld id="{1D8BD707-D9CF-40AE-B4C6-C98DA3205C09}" type="datetimeFigureOut">
               <a:rPr lang="en-US" smtClean="0"/>
               <a:pPr/>
-              <a:t>4/22/2017</a:t>
+              <a:t>4/23/2017</a:t>
             </a:fld>
             <a:endParaRPr lang="en-US"/>
           </a:p>
@@ -3162,7 +3169,7 @@
             <a:fld id="{1D8BD707-D9CF-40AE-B4C6-C98DA3205C09}" type="datetimeFigureOut">
               <a:rPr lang="en-US" smtClean="0"/>
               <a:pPr/>
-              <a:t>4/22/2017</a:t>
+              <a:t>4/23/2017</a:t>
             </a:fld>
             <a:endParaRPr lang="en-US"/>
           </a:p>
@@ -3306,10 +3313,9 @@
           </a:lstStyle>
           <a:p>
             <a:r>
-              <a:rPr kumimoji="0" lang="en-US" smtClean="0"/>
+              <a:rPr kumimoji="0" lang="en-US"/>
               <a:t>Click to edit Master title style</a:t>
             </a:r>
-            <a:endParaRPr kumimoji="0" lang="en-US"/>
           </a:p>
         </p:txBody>
       </p:sp>
@@ -3362,7 +3368,7 @@
           <a:p>
             <a:pPr lvl="0" eaLnBrk="1" latinLnBrk="0" hangingPunct="1"/>
             <a:r>
-              <a:rPr kumimoji="0" lang="en-US" smtClean="0"/>
+              <a:rPr kumimoji="0" lang="en-US"/>
               <a:t>Click to edit Master text styles</a:t>
             </a:r>
           </a:p>
@@ -3628,35 +3634,35 @@
           <a:p>
             <a:pPr lvl="0" eaLnBrk="1" latinLnBrk="0" hangingPunct="1"/>
             <a:r>
-              <a:rPr lang="en-US" smtClean="0"/>
+              <a:rPr lang="en-US"/>
               <a:t>Click to edit Master text styles</a:t>
             </a:r>
           </a:p>
           <a:p>
             <a:pPr lvl="1" eaLnBrk="1" latinLnBrk="0" hangingPunct="1"/>
             <a:r>
-              <a:rPr lang="en-US" smtClean="0"/>
+              <a:rPr lang="en-US"/>
               <a:t>Second level</a:t>
             </a:r>
           </a:p>
           <a:p>
             <a:pPr lvl="2" eaLnBrk="1" latinLnBrk="0" hangingPunct="1"/>
             <a:r>
-              <a:rPr lang="en-US" smtClean="0"/>
+              <a:rPr lang="en-US"/>
               <a:t>Third level</a:t>
             </a:r>
           </a:p>
           <a:p>
             <a:pPr lvl="3" eaLnBrk="1" latinLnBrk="0" hangingPunct="1"/>
             <a:r>
-              <a:rPr lang="en-US" smtClean="0"/>
+              <a:rPr lang="en-US"/>
               <a:t>Fourth level</a:t>
             </a:r>
           </a:p>
           <a:p>
             <a:pPr lvl="4" eaLnBrk="1" latinLnBrk="0" hangingPunct="1"/>
             <a:r>
-              <a:rPr lang="en-US" smtClean="0"/>
+              <a:rPr lang="en-US"/>
               <a:t>Fifth level</a:t>
             </a:r>
             <a:endParaRPr kumimoji="0" lang="en-US"/>
@@ -3681,7 +3687,7 @@
             <a:fld id="{1D8BD707-D9CF-40AE-B4C6-C98DA3205C09}" type="datetimeFigureOut">
               <a:rPr lang="en-US" smtClean="0"/>
               <a:pPr/>
-              <a:t>4/22/2017</a:t>
+              <a:t>4/23/2017</a:t>
             </a:fld>
             <a:endParaRPr lang="en-US"/>
           </a:p>
@@ -3862,10 +3868,9 @@
           </a:lstStyle>
           <a:p>
             <a:r>
-              <a:rPr kumimoji="0" lang="en-US" smtClean="0"/>
+              <a:rPr kumimoji="0" lang="en-US"/>
               <a:t>Click to edit Master title style</a:t>
             </a:r>
-            <a:endParaRPr kumimoji="0" lang="en-US"/>
           </a:p>
         </p:txBody>
       </p:sp>
@@ -3921,7 +3926,7 @@
               <a:buNone/>
             </a:pPr>
             <a:r>
-              <a:rPr kumimoji="0" lang="en-US" smtClean="0"/>
+              <a:rPr kumimoji="0" lang="en-US"/>
               <a:t>Click icon to add picture</a:t>
             </a:r>
             <a:endParaRPr kumimoji="0" lang="en-US" dirty="0"/>
@@ -3976,7 +3981,7 @@
           <a:p>
             <a:pPr lvl="0" eaLnBrk="1" latinLnBrk="0" hangingPunct="1"/>
             <a:r>
-              <a:rPr kumimoji="0" lang="en-US" smtClean="0"/>
+              <a:rPr kumimoji="0" lang="en-US"/>
               <a:t>Click to edit Master text styles</a:t>
             </a:r>
           </a:p>
@@ -4194,7 +4199,7 @@
             <a:fld id="{1D8BD707-D9CF-40AE-B4C6-C98DA3205C09}" type="datetimeFigureOut">
               <a:rPr lang="en-US" smtClean="0"/>
               <a:pPr/>
-              <a:t>4/22/2017</a:t>
+              <a:t>4/23/2017</a:t>
             </a:fld>
             <a:endParaRPr lang="en-US"/>
           </a:p>
@@ -4338,10 +4343,9 @@
           <a:lstStyle/>
           <a:p>
             <a:r>
-              <a:rPr kumimoji="0" lang="en-US" smtClean="0"/>
+              <a:rPr kumimoji="0" lang="en-US"/>
               <a:t>Click to edit Master title style</a:t>
             </a:r>
-            <a:endParaRPr kumimoji="0" lang="en-US"/>
           </a:p>
         </p:txBody>
       </p:sp>
@@ -4372,38 +4376,37 @@
           <a:p>
             <a:pPr lvl="0" eaLnBrk="1" latinLnBrk="0" hangingPunct="1"/>
             <a:r>
-              <a:rPr kumimoji="0" lang="en-US" smtClean="0"/>
+              <a:rPr kumimoji="0" lang="en-US"/>
               <a:t>Click to edit Master text styles</a:t>
             </a:r>
           </a:p>
           <a:p>
             <a:pPr lvl="1" eaLnBrk="1" latinLnBrk="0" hangingPunct="1"/>
             <a:r>
-              <a:rPr kumimoji="0" lang="en-US" smtClean="0"/>
+              <a:rPr kumimoji="0" lang="en-US"/>
               <a:t>Second level</a:t>
             </a:r>
           </a:p>
           <a:p>
             <a:pPr lvl="2" eaLnBrk="1" latinLnBrk="0" hangingPunct="1"/>
             <a:r>
-              <a:rPr kumimoji="0" lang="en-US" smtClean="0"/>
+              <a:rPr kumimoji="0" lang="en-US"/>
               <a:t>Third level</a:t>
             </a:r>
           </a:p>
           <a:p>
             <a:pPr lvl="3" eaLnBrk="1" latinLnBrk="0" hangingPunct="1"/>
             <a:r>
-              <a:rPr kumimoji="0" lang="en-US" smtClean="0"/>
+              <a:rPr kumimoji="0" lang="en-US"/>
               <a:t>Fourth level</a:t>
             </a:r>
           </a:p>
           <a:p>
             <a:pPr lvl="4" eaLnBrk="1" latinLnBrk="0" hangingPunct="1"/>
             <a:r>
-              <a:rPr kumimoji="0" lang="en-US" smtClean="0"/>
+              <a:rPr kumimoji="0" lang="en-US"/>
               <a:t>Fifth level</a:t>
             </a:r>
-            <a:endParaRPr kumimoji="0" lang="en-US"/>
           </a:p>
         </p:txBody>
       </p:sp>
@@ -4441,7 +4444,7 @@
             <a:fld id="{1D8BD707-D9CF-40AE-B4C6-C98DA3205C09}" type="datetimeFigureOut">
               <a:rPr lang="en-US" smtClean="0"/>
               <a:pPr/>
-              <a:t>4/22/2017</a:t>
+              <a:t>4/23/2017</a:t>
             </a:fld>
             <a:endParaRPr lang="en-US"/>
           </a:p>
@@ -5063,14 +5066,13 @@
           <a:lstStyle/>
           <a:p>
             <a:r>
-              <a:rPr lang="en-US" dirty="0" err="1" smtClean="0"/>
+              <a:rPr lang="en-US" dirty="0" err="1"/>
               <a:t>Elasticsearch</a:t>
             </a:r>
             <a:r>
-              <a:rPr lang="en-US" dirty="0" smtClean="0"/>
+              <a:rPr lang="en-US" dirty="0"/>
               <a:t> Tool Demo</a:t>
             </a:r>
-            <a:endParaRPr lang="en-US" dirty="0"/>
           </a:p>
         </p:txBody>
       </p:sp>
@@ -5090,10 +5092,9 @@
           <a:lstStyle/>
           <a:p>
             <a:r>
-              <a:rPr lang="en-US" dirty="0" smtClean="0"/>
+              <a:rPr lang="en-US" dirty="0"/>
               <a:t>Presented by: Zack Harnett &amp; Jenna Wise</a:t>
             </a:r>
-            <a:endParaRPr lang="en-US" dirty="0"/>
           </a:p>
         </p:txBody>
       </p:sp>
@@ -5107,13 +5108,6 @@
   <p:clrMapOvr>
     <a:masterClrMapping/>
   </p:clrMapOvr>
-  <p:timing>
-    <p:tnLst>
-      <p:par>
-        <p:cTn id="1" dur="indefinite" restart="never" nodeType="tmRoot"/>
-      </p:par>
-    </p:tnLst>
-  </p:timing>
 </p:sld>
 </file>
 
@@ -5150,10 +5144,9 @@
           <a:lstStyle/>
           <a:p>
             <a:r>
-              <a:rPr lang="en-US" dirty="0" smtClean="0"/>
+              <a:rPr lang="en-US" dirty="0"/>
               <a:t>Adding/Deleting Data</a:t>
             </a:r>
-            <a:endParaRPr lang="en-US" dirty="0"/>
           </a:p>
         </p:txBody>
       </p:sp>
@@ -5180,37 +5173,25 @@
           <a:lstStyle/>
           <a:p>
             <a:r>
-              <a:rPr lang="en-US" dirty="0" smtClean="0"/>
+              <a:rPr lang="en-US" dirty="0"/>
               <a:t>To index a JSON object make a </a:t>
             </a:r>
             <a:r>
-              <a:rPr lang="en-US" b="1" dirty="0" smtClean="0"/>
+              <a:rPr lang="en-US" b="1" dirty="0"/>
               <a:t>POST </a:t>
             </a:r>
             <a:r>
-              <a:rPr lang="en-US" dirty="0" smtClean="0"/>
+              <a:rPr lang="en-US" dirty="0"/>
               <a:t>request to the REST API at </a:t>
-            </a:r>
-            <a:r>
-              <a:rPr lang="en-US" dirty="0" smtClean="0">
-                <a:hlinkClick r:id="rId2"/>
-              </a:rPr>
-              <a:t>http</a:t>
             </a:r>
             <a:r>
               <a:rPr lang="en-US" dirty="0">
                 <a:hlinkClick r:id="rId2"/>
               </a:rPr>
-              <a:t>://localhost:9200/&lt;index&gt;/&lt;type&gt;/[&lt;id</a:t>
-            </a:r>
-            <a:r>
-              <a:rPr lang="en-US" dirty="0" smtClean="0">
-                <a:hlinkClick r:id="rId2"/>
-              </a:rPr>
-              <a:t>&gt;]/</a:t>
-            </a:r>
-            <a:r>
-              <a:rPr lang="en-US" dirty="0" smtClean="0"/>
+              <a:t>http://localhost:9200/&lt;index&gt;/&lt;type&gt;/[&lt;id&gt;]/</a:t>
+            </a:r>
+            <a:r>
+              <a:rPr lang="en-US" dirty="0"/>
               <a:t> with a JSON request body</a:t>
             </a:r>
           </a:p>
@@ -5219,40 +5200,30 @@
           </a:p>
           <a:p>
             <a:r>
-              <a:rPr lang="en-US" dirty="0" smtClean="0"/>
+              <a:rPr lang="en-US" dirty="0"/>
               <a:t>To delete any index, type, or id JSON object make a </a:t>
             </a:r>
             <a:r>
-              <a:rPr lang="en-US" b="1" dirty="0" smtClean="0"/>
+              <a:rPr lang="en-US" b="1" dirty="0"/>
               <a:t>DELETE </a:t>
             </a:r>
             <a:r>
-              <a:rPr lang="en-US" dirty="0" smtClean="0"/>
+              <a:rPr lang="en-US" dirty="0"/>
               <a:t>request to the REST API at </a:t>
             </a:r>
             <a:r>
               <a:rPr lang="en-US" dirty="0">
                 <a:hlinkClick r:id="rId2"/>
               </a:rPr>
-              <a:t>http://localhost:9200/&lt;index&gt;/&lt;type&gt;/[&lt;id</a:t>
-            </a:r>
-            <a:r>
-              <a:rPr lang="en-US" dirty="0" smtClean="0">
-                <a:hlinkClick r:id="rId2"/>
-              </a:rPr>
-              <a:t>&gt;]/</a:t>
-            </a:r>
-            <a:r>
-              <a:rPr lang="en-US" dirty="0"/>
-              <a:t> </a:t>
-            </a:r>
-            <a:r>
-              <a:rPr lang="en-US" dirty="0" smtClean="0"/>
-              <a:t>with a empty request body</a:t>
-            </a:r>
-          </a:p>
-          <a:p>
-            <a:endParaRPr lang="en-US" dirty="0" smtClean="0"/>
+              <a:t>http://localhost:9200/&lt;index&gt;/&lt;type&gt;/[&lt;id&gt;]/</a:t>
+            </a:r>
+            <a:r>
+              <a:rPr lang="en-US" dirty="0"/>
+              <a:t> with a empty request body</a:t>
+            </a:r>
+          </a:p>
+          <a:p>
+            <a:endParaRPr lang="en-US" dirty="0"/>
           </a:p>
           <a:p>
             <a:endParaRPr lang="en-US" dirty="0"/>
@@ -5301,13 +5272,6 @@
   <p:clrMapOvr>
     <a:masterClrMapping/>
   </p:clrMapOvr>
-  <p:timing>
-    <p:tnLst>
-      <p:par>
-        <p:cTn id="1" dur="indefinite" restart="never" nodeType="tmRoot"/>
-      </p:par>
-    </p:tnLst>
-  </p:timing>
 </p:sld>
 </file>
 
@@ -5569,27 +5533,27 @@
           </a:lstStyle>
           <a:p>
             <a:r>
-              <a:rPr lang="en-US" dirty="0" smtClean="0"/>
+              <a:rPr lang="en-US" dirty="0"/>
               <a:t>Index is </a:t>
             </a:r>
             <a:r>
-              <a:rPr lang="en-US" b="1" dirty="0" smtClean="0"/>
+              <a:rPr lang="en-US" b="1" dirty="0"/>
               <a:t>movies</a:t>
             </a:r>
             <a:r>
-              <a:rPr lang="en-US" dirty="0" smtClean="0"/>
+              <a:rPr lang="en-US" dirty="0"/>
               <a:t>, type is </a:t>
             </a:r>
             <a:r>
-              <a:rPr lang="en-US" b="1" dirty="0" smtClean="0"/>
+              <a:rPr lang="en-US" b="1" dirty="0"/>
               <a:t>movie</a:t>
             </a:r>
             <a:r>
-              <a:rPr lang="en-US" dirty="0" smtClean="0"/>
+              <a:rPr lang="en-US" dirty="0"/>
               <a:t>, and id is </a:t>
             </a:r>
             <a:r>
-              <a:rPr lang="en-US" b="1" dirty="0" smtClean="0"/>
+              <a:rPr lang="en-US" b="1" dirty="0"/>
               <a:t>1</a:t>
             </a:r>
             <a:endParaRPr lang="en-US" dirty="0"/>
@@ -5606,13 +5570,6 @@
   <p:clrMapOvr>
     <a:masterClrMapping/>
   </p:clrMapOvr>
-  <p:timing>
-    <p:tnLst>
-      <p:par>
-        <p:cTn id="1" dur="indefinite" restart="never" nodeType="tmRoot"/>
-      </p:par>
-    </p:tnLst>
-  </p:timing>
 </p:sld>
 </file>
 
@@ -5874,18 +5831,17 @@
           </a:lstStyle>
           <a:p>
             <a:r>
-              <a:rPr lang="en-US" dirty="0" smtClean="0"/>
+              <a:rPr lang="en-US" dirty="0"/>
               <a:t>The </a:t>
             </a:r>
             <a:r>
-              <a:rPr lang="en-US" b="1" dirty="0" smtClean="0"/>
+              <a:rPr lang="en-US" b="1" dirty="0"/>
               <a:t>Inspectors</a:t>
             </a:r>
             <a:r>
-              <a:rPr lang="en-US" dirty="0" smtClean="0"/>
+              <a:rPr lang="en-US" dirty="0"/>
               <a:t> tab in Fiddler shows the request response</a:t>
             </a:r>
-            <a:endParaRPr lang="en-US" dirty="0"/>
           </a:p>
         </p:txBody>
       </p:sp>
@@ -5899,13 +5855,6 @@
   <p:clrMapOvr>
     <a:masterClrMapping/>
   </p:clrMapOvr>
-  <p:timing>
-    <p:tnLst>
-      <p:par>
-        <p:cTn id="1" dur="indefinite" restart="never" nodeType="tmRoot"/>
-      </p:par>
-    </p:tnLst>
-  </p:timing>
 </p:sld>
 </file>
 
@@ -5942,10 +5891,9 @@
           <a:lstStyle/>
           <a:p>
             <a:r>
-              <a:rPr lang="en-US" dirty="0" smtClean="0"/>
+              <a:rPr lang="en-US" dirty="0"/>
               <a:t>Basic Searching</a:t>
             </a:r>
-            <a:endParaRPr lang="en-US" dirty="0"/>
           </a:p>
         </p:txBody>
       </p:sp>
@@ -5970,33 +5918,27 @@
           <a:lstStyle/>
           <a:p>
             <a:r>
-              <a:rPr lang="en-US" dirty="0" smtClean="0"/>
+              <a:rPr lang="en-US" dirty="0"/>
               <a:t>Make requests using </a:t>
             </a:r>
             <a:r>
-              <a:rPr lang="en-US" b="1" dirty="0" smtClean="0"/>
+              <a:rPr lang="en-US" b="1" dirty="0"/>
               <a:t>POST </a:t>
             </a:r>
             <a:r>
               <a:rPr lang="en-US" dirty="0">
                 <a:hlinkClick r:id="rId2"/>
               </a:rPr>
-              <a:t>http://localhost:9200/&lt;index&gt;/&lt;type&gt;/_</a:t>
-            </a:r>
-            <a:r>
-              <a:rPr lang="en-US" dirty="0" smtClean="0">
-                <a:hlinkClick r:id="rId2"/>
-              </a:rPr>
-              <a:t>search</a:t>
-            </a:r>
-            <a:endParaRPr lang="en-US" dirty="0" smtClean="0"/>
-          </a:p>
-          <a:p>
+              <a:t>http://localhost:9200/&lt;index&gt;/&lt;type&gt;/_search</a:t>
+            </a:r>
             <a:endParaRPr lang="en-US" dirty="0"/>
           </a:p>
           <a:p>
-            <a:r>
-              <a:rPr lang="en-US" dirty="0" smtClean="0"/>
+            <a:endParaRPr lang="en-US" dirty="0"/>
+          </a:p>
+          <a:p>
+            <a:r>
+              <a:rPr lang="en-US" dirty="0"/>
               <a:t>The request body should look like</a:t>
             </a:r>
           </a:p>
@@ -6254,14 +6196,14 @@
           </a:lstStyle>
           <a:p>
             <a:r>
-              <a:rPr lang="en-US" dirty="0" smtClean="0"/>
+              <a:rPr lang="en-US" dirty="0"/>
               <a:t>Where Query DSLs are specialized JSON syntax found in the Search APIs for </a:t>
             </a:r>
             <a:r>
-              <a:rPr lang="en-US" dirty="0" err="1" smtClean="0"/>
+              <a:rPr lang="en-US" dirty="0" err="1"/>
               <a:t>Elasticsearch</a:t>
             </a:r>
-            <a:endParaRPr lang="en-US" dirty="0" smtClean="0"/>
+            <a:endParaRPr lang="en-US" dirty="0"/>
           </a:p>
         </p:txBody>
       </p:sp>
@@ -6275,13 +6217,6 @@
   <p:clrMapOvr>
     <a:masterClrMapping/>
   </p:clrMapOvr>
-  <p:timing>
-    <p:tnLst>
-      <p:par>
-        <p:cTn id="1" dur="indefinite" restart="never" nodeType="tmRoot"/>
-      </p:par>
-    </p:tnLst>
-  </p:timing>
 </p:sld>
 </file>
 
@@ -6318,10 +6253,9 @@
           <a:lstStyle/>
           <a:p>
             <a:r>
-              <a:rPr lang="en-US" dirty="0" smtClean="0"/>
+              <a:rPr lang="en-US" dirty="0"/>
               <a:t>Basic Searching</a:t>
             </a:r>
-            <a:endParaRPr lang="en-US" dirty="0"/>
           </a:p>
         </p:txBody>
       </p:sp>
@@ -6348,34 +6282,28 @@
           <a:lstStyle/>
           <a:p>
             <a:r>
-              <a:rPr lang="en-US" dirty="0" smtClean="0"/>
+              <a:rPr lang="en-US" dirty="0"/>
               <a:t>For example,</a:t>
             </a:r>
           </a:p>
           <a:p>
             <a:pPr lvl="1"/>
             <a:r>
-              <a:rPr lang="en-US" dirty="0" smtClean="0"/>
+              <a:rPr lang="en-US" dirty="0"/>
               <a:t>Making </a:t>
             </a:r>
             <a:r>
-              <a:rPr lang="en-US" b="1" dirty="0" smtClean="0"/>
+              <a:rPr lang="en-US" b="1" dirty="0"/>
               <a:t>POST </a:t>
             </a:r>
             <a:r>
               <a:rPr lang="en-US" dirty="0">
                 <a:hlinkClick r:id="rId2"/>
               </a:rPr>
-              <a:t>http://localhost:9200/movies/movie/_</a:t>
-            </a:r>
-            <a:r>
-              <a:rPr lang="en-US" dirty="0" smtClean="0">
-                <a:hlinkClick r:id="rId2"/>
-              </a:rPr>
-              <a:t>search</a:t>
-            </a:r>
-            <a:r>
-              <a:rPr lang="en-US" dirty="0" smtClean="0"/>
+              <a:t>http://localhost:9200/movies/movie/_search</a:t>
+            </a:r>
+            <a:r>
+              <a:rPr lang="en-US" dirty="0"/>
               <a:t> request with the request body below</a:t>
             </a:r>
           </a:p>
@@ -6633,26 +6561,25 @@
           </a:lstStyle>
           <a:p>
             <a:r>
-              <a:rPr lang="en-US" dirty="0" smtClean="0"/>
+              <a:rPr lang="en-US" dirty="0"/>
               <a:t>Searches for the word </a:t>
             </a:r>
             <a:r>
-              <a:rPr lang="en-US" b="1" dirty="0" smtClean="0"/>
+              <a:rPr lang="en-US" b="1" dirty="0"/>
               <a:t>kill </a:t>
             </a:r>
             <a:r>
-              <a:rPr lang="en-US" dirty="0" smtClean="0"/>
+              <a:rPr lang="en-US" dirty="0"/>
               <a:t>in all of the </a:t>
             </a:r>
             <a:r>
-              <a:rPr lang="en-US" b="1" dirty="0" smtClean="0"/>
+              <a:rPr lang="en-US" b="1" dirty="0"/>
               <a:t>movie</a:t>
             </a:r>
             <a:r>
-              <a:rPr lang="en-US" dirty="0" smtClean="0"/>
+              <a:rPr lang="en-US" dirty="0"/>
               <a:t> type documents</a:t>
             </a:r>
-            <a:endParaRPr lang="en-US" dirty="0" smtClean="0"/>
           </a:p>
         </p:txBody>
       </p:sp>
@@ -6666,13 +6593,6 @@
   <p:clrMapOvr>
     <a:masterClrMapping/>
   </p:clrMapOvr>
-  <p:timing>
-    <p:tnLst>
-      <p:par>
-        <p:cTn id="1" dur="indefinite" restart="never" nodeType="tmRoot"/>
-      </p:par>
-    </p:tnLst>
-  </p:timing>
 </p:sld>
 </file>
 
@@ -6709,10 +6629,9 @@
           <a:lstStyle/>
           <a:p>
             <a:r>
-              <a:rPr lang="en-US" dirty="0" smtClean="0"/>
+              <a:rPr lang="en-US" dirty="0"/>
               <a:t>Making HTTP Requests Demo Video</a:t>
             </a:r>
-            <a:endParaRPr lang="en-US" dirty="0"/>
           </a:p>
         </p:txBody>
       </p:sp>
@@ -6740,15 +6659,9 @@
               <a:rPr lang="en-US" dirty="0">
                 <a:hlinkClick r:id="rId3"/>
               </a:rPr>
-              <a:t>https://</a:t>
-            </a:r>
-            <a:r>
-              <a:rPr lang="en-US" dirty="0" smtClean="0">
-                <a:hlinkClick r:id="rId3"/>
-              </a:rPr>
-              <a:t>youtu.be/60UsHHsKyN4?list=PLw5h0DiJ-9PDStvJYc1LOZiEm1ehlEKLP</a:t>
-            </a:r>
-            <a:endParaRPr lang="en-US" dirty="0" smtClean="0"/>
+              <a:t>https://youtu.be/60UsHHsKyN4?list=PLw5h0DiJ-9PDStvJYc1LOZiEm1ehlEKLP</a:t>
+            </a:r>
+            <a:endParaRPr lang="en-US" dirty="0"/>
           </a:p>
           <a:p>
             <a:endParaRPr lang="en-US" dirty="0"/>
@@ -6791,13 +6704,6 @@
   <p:clrMapOvr>
     <a:masterClrMapping/>
   </p:clrMapOvr>
-  <p:timing>
-    <p:tnLst>
-      <p:par>
-        <p:cTn id="1" dur="indefinite" restart="never" nodeType="tmRoot"/>
-      </p:par>
-    </p:tnLst>
-  </p:timing>
 </p:sld>
 </file>
 
@@ -6834,10 +6740,9 @@
           <a:lstStyle/>
           <a:p>
             <a:r>
-              <a:rPr lang="en-US" dirty="0" smtClean="0"/>
+              <a:rPr lang="en-US" dirty="0"/>
               <a:t>Key Concepts</a:t>
             </a:r>
-            <a:endParaRPr lang="en-US" dirty="0"/>
           </a:p>
         </p:txBody>
       </p:sp>
@@ -6859,21 +6764,21 @@
           <a:lstStyle/>
           <a:p>
             <a:r>
-              <a:rPr lang="en-US" dirty="0" smtClean="0"/>
+              <a:rPr lang="en-US" dirty="0"/>
               <a:t>Node</a:t>
             </a:r>
           </a:p>
           <a:p>
             <a:pPr lvl="1"/>
             <a:r>
-              <a:rPr lang="en-US" dirty="0" smtClean="0"/>
+              <a:rPr lang="en-US" dirty="0"/>
               <a:t>A single running instance of </a:t>
             </a:r>
             <a:r>
-              <a:rPr lang="en-US" dirty="0" err="1" smtClean="0"/>
+              <a:rPr lang="en-US" dirty="0" err="1"/>
               <a:t>Elasticsearch</a:t>
             </a:r>
-            <a:endParaRPr lang="en-US" dirty="0" smtClean="0"/>
+            <a:endParaRPr lang="en-US" dirty="0"/>
           </a:p>
           <a:p>
             <a:pPr lvl="1"/>
@@ -6881,33 +6786,32 @@
           </a:p>
           <a:p>
             <a:r>
-              <a:rPr lang="en-US" dirty="0" smtClean="0"/>
+              <a:rPr lang="en-US" dirty="0"/>
               <a:t>Cluster</a:t>
             </a:r>
           </a:p>
           <a:p>
             <a:pPr lvl="1"/>
             <a:r>
-              <a:rPr lang="en-US" dirty="0" smtClean="0"/>
+              <a:rPr lang="en-US" dirty="0"/>
               <a:t>Collection of one or more nodes</a:t>
             </a:r>
           </a:p>
           <a:p>
             <a:pPr lvl="1"/>
             <a:r>
-              <a:rPr lang="en-US" dirty="0" smtClean="0"/>
+              <a:rPr lang="en-US" dirty="0"/>
               <a:t>Can index and search across all nodes in a cluster</a:t>
             </a:r>
           </a:p>
           <a:p>
-            <a:endParaRPr lang="en-US" dirty="0" smtClean="0"/>
-          </a:p>
-          <a:p>
-            <a:r>
-              <a:rPr lang="en-US" dirty="0" smtClean="0"/>
+            <a:endParaRPr lang="en-US" dirty="0"/>
+          </a:p>
+          <a:p>
+            <a:r>
+              <a:rPr lang="en-US" dirty="0"/>
               <a:t>Document</a:t>
             </a:r>
-            <a:endParaRPr lang="en-US" dirty="0"/>
           </a:p>
           <a:p>
             <a:pPr lvl="1"/>
@@ -6920,13 +6824,8 @@
             <a:pPr lvl="1"/>
             <a:r>
               <a:rPr lang="en-US" dirty="0"/>
-              <a:t>Belongs to a type unique </a:t>
-            </a:r>
-            <a:r>
-              <a:rPr lang="en-US" dirty="0" smtClean="0"/>
-              <a:t>UID</a:t>
-            </a:r>
-            <a:endParaRPr lang="en-US" dirty="0"/>
+              <a:t>Belongs to a type unique UID</a:t>
+            </a:r>
           </a:p>
         </p:txBody>
       </p:sp>
@@ -6940,13 +6839,6 @@
   <p:clrMapOvr>
     <a:masterClrMapping/>
   </p:clrMapOvr>
-  <p:timing>
-    <p:tnLst>
-      <p:par>
-        <p:cTn id="1" dur="indefinite" restart="never" nodeType="tmRoot"/>
-      </p:par>
-    </p:tnLst>
-  </p:timing>
 </p:sld>
 </file>
 
@@ -6983,10 +6875,9 @@
           <a:lstStyle/>
           <a:p>
             <a:r>
-              <a:rPr lang="en-US" dirty="0" smtClean="0"/>
+              <a:rPr lang="en-US" dirty="0"/>
               <a:t>Key Concepts</a:t>
             </a:r>
-            <a:endParaRPr lang="en-US" dirty="0"/>
           </a:p>
         </p:txBody>
       </p:sp>
@@ -7028,18 +6919,18 @@
             <a:pPr marL="0" indent="0">
               <a:buNone/>
             </a:pPr>
-            <a:endParaRPr lang="en-US" dirty="0" smtClean="0"/>
-          </a:p>
-          <a:p>
-            <a:r>
-              <a:rPr lang="en-US" dirty="0" smtClean="0"/>
+            <a:endParaRPr lang="en-US" dirty="0"/>
+          </a:p>
+          <a:p>
+            <a:r>
+              <a:rPr lang="en-US" dirty="0"/>
               <a:t>Type/Mapping</a:t>
             </a:r>
           </a:p>
           <a:p>
             <a:pPr lvl="1"/>
             <a:r>
-              <a:rPr lang="en-US" dirty="0" smtClean="0"/>
+              <a:rPr lang="en-US" dirty="0"/>
               <a:t>Collection of documents sharing a set of common fields present in the same index</a:t>
             </a:r>
           </a:p>
@@ -7051,24 +6942,23 @@
           </a:p>
           <a:p>
             <a:r>
-              <a:rPr lang="en-US" dirty="0" smtClean="0"/>
+              <a:rPr lang="en-US" dirty="0"/>
               <a:t>Shard</a:t>
             </a:r>
           </a:p>
           <a:p>
             <a:pPr lvl="1"/>
             <a:r>
-              <a:rPr lang="en-US" dirty="0" smtClean="0"/>
+              <a:rPr lang="en-US" dirty="0"/>
               <a:t>Horizontally subdivided indexes in a node</a:t>
             </a:r>
           </a:p>
           <a:p>
             <a:pPr lvl="1"/>
             <a:r>
-              <a:rPr lang="en-US" dirty="0" smtClean="0"/>
+              <a:rPr lang="en-US" dirty="0"/>
               <a:t>Contains all properties of a document with less JSON objects than an index</a:t>
             </a:r>
-            <a:endParaRPr lang="en-US" dirty="0"/>
           </a:p>
         </p:txBody>
       </p:sp>
@@ -7082,13 +6972,6 @@
   <p:clrMapOvr>
     <a:masterClrMapping/>
   </p:clrMapOvr>
-  <p:timing>
-    <p:tnLst>
-      <p:par>
-        <p:cTn id="1" dur="indefinite" restart="never" nodeType="tmRoot"/>
-      </p:par>
-    </p:tnLst>
-  </p:timing>
 </p:sld>
 </file>
 
@@ -7125,29 +7008,70 @@
           <a:lstStyle/>
           <a:p>
             <a:r>
-              <a:rPr lang="en-US" dirty="0" smtClean="0"/>
+              <a:rPr lang="en-US" dirty="0"/>
               <a:t>About</a:t>
             </a:r>
+          </a:p>
+        </p:txBody>
+      </p:sp>
+      <p:sp>
+        <p:nvSpPr>
+          <p:cNvPr id="3" name="Content Placeholder 2"/>
+          <p:cNvSpPr>
+            <a:spLocks noGrp="1"/>
+          </p:cNvSpPr>
+          <p:nvPr>
+            <p:ph sz="quarter" idx="1"/>
+          </p:nvPr>
+        </p:nvSpPr>
+        <p:spPr/>
+        <p:txBody>
+          <a:bodyPr/>
+          <a:lstStyle/>
+          <a:p>
+            <a:r>
+              <a:rPr lang="en-US" dirty="0"/>
+              <a:t>RESTful search engine that is built for the cloud.</a:t>
+            </a:r>
+          </a:p>
+          <a:p>
+            <a:r>
+              <a:rPr lang="en-US" dirty="0"/>
+              <a:t>Completely </a:t>
+            </a:r>
+            <a:r>
+              <a:rPr lang="en-US" dirty="0" err="1"/>
+              <a:t>sharded</a:t>
+            </a:r>
+            <a:r>
+              <a:rPr lang="en-US" dirty="0"/>
+              <a:t> with a configurable number of shards.</a:t>
+            </a:r>
+          </a:p>
+          <a:p>
+            <a:r>
+              <a:rPr lang="en-US" dirty="0"/>
+              <a:t>Document oriented search</a:t>
+            </a:r>
+          </a:p>
+          <a:p>
+            <a:r>
+              <a:rPr lang="en-US" dirty="0"/>
+              <a:t>Nearly real time search</a:t>
+            </a:r>
+          </a:p>
+          <a:p>
+            <a:r>
+              <a:rPr lang="en-US" dirty="0"/>
+              <a:t>Atomic isolation for each operation for consistency and durability</a:t>
+            </a:r>
+          </a:p>
+          <a:p>
+            <a:r>
+              <a:rPr lang="en-US"/>
+              <a:t>Easy scalability</a:t>
+            </a:r>
             <a:endParaRPr lang="en-US" dirty="0"/>
-          </a:p>
-        </p:txBody>
-      </p:sp>
-      <p:sp>
-        <p:nvSpPr>
-          <p:cNvPr id="3" name="Content Placeholder 2"/>
-          <p:cNvSpPr>
-            <a:spLocks noGrp="1"/>
-          </p:cNvSpPr>
-          <p:nvPr>
-            <p:ph sz="quarter" idx="1"/>
-          </p:nvPr>
-        </p:nvSpPr>
-        <p:spPr/>
-        <p:txBody>
-          <a:bodyPr/>
-          <a:lstStyle/>
-          <a:p>
-            <a:endParaRPr lang="en-US"/>
           </a:p>
         </p:txBody>
       </p:sp>
@@ -7161,13 +7085,6 @@
   <p:clrMapOvr>
     <a:masterClrMapping/>
   </p:clrMapOvr>
-  <p:timing>
-    <p:tnLst>
-      <p:par>
-        <p:cTn id="1" dur="indefinite" restart="never" nodeType="tmRoot"/>
-      </p:par>
-    </p:tnLst>
-  </p:timing>
 </p:sld>
 </file>
 
@@ -7204,10 +7121,9 @@
           <a:lstStyle/>
           <a:p>
             <a:r>
-              <a:rPr lang="en-US" dirty="0" smtClean="0"/>
+              <a:rPr lang="en-US" dirty="0"/>
               <a:t>Use Cases</a:t>
             </a:r>
-            <a:endParaRPr lang="en-US" dirty="0"/>
           </a:p>
         </p:txBody>
       </p:sp>
@@ -7227,29 +7143,29 @@
           <a:lstStyle/>
           <a:p>
             <a:r>
-              <a:rPr lang="en-US" dirty="0" smtClean="0"/>
+              <a:rPr lang="en-US" dirty="0"/>
               <a:t>Classical full text search</a:t>
             </a:r>
           </a:p>
           <a:p>
             <a:pPr lvl="1"/>
             <a:r>
-              <a:rPr lang="en-US" dirty="0" smtClean="0"/>
+              <a:rPr lang="en-US" dirty="0"/>
               <a:t>Fuzzy searches (spell checker)</a:t>
             </a:r>
           </a:p>
           <a:p>
             <a:pPr lvl="1"/>
             <a:r>
-              <a:rPr lang="en-US" dirty="0" smtClean="0"/>
+              <a:rPr lang="en-US" dirty="0"/>
               <a:t>Auto completion (family of </a:t>
             </a:r>
             <a:r>
-              <a:rPr lang="en-US" dirty="0" err="1" smtClean="0"/>
+              <a:rPr lang="en-US" dirty="0" err="1"/>
               <a:t>suggesters</a:t>
             </a:r>
             <a:r>
-              <a:rPr lang="en-US" dirty="0" smtClean="0"/>
+              <a:rPr lang="en-US" dirty="0"/>
               <a:t>)</a:t>
             </a:r>
           </a:p>
@@ -7259,43 +7175,41 @@
           </a:p>
           <a:p>
             <a:r>
-              <a:rPr lang="en-US" dirty="0" smtClean="0"/>
+              <a:rPr lang="en-US" dirty="0"/>
               <a:t>Analytics with </a:t>
             </a:r>
             <a:r>
-              <a:rPr lang="en-US" dirty="0" err="1" smtClean="0"/>
+              <a:rPr lang="en-US" dirty="0" err="1"/>
               <a:t>Kibana</a:t>
             </a:r>
             <a:r>
-              <a:rPr lang="en-US" dirty="0" smtClean="0"/>
+              <a:rPr lang="en-US" dirty="0"/>
               <a:t> and </a:t>
             </a:r>
             <a:r>
-              <a:rPr lang="en-US" dirty="0" err="1" smtClean="0"/>
+              <a:rPr lang="en-US" dirty="0" err="1"/>
               <a:t>Logstash</a:t>
             </a:r>
-            <a:endParaRPr lang="en-US" dirty="0" smtClean="0"/>
+            <a:endParaRPr lang="en-US" dirty="0"/>
           </a:p>
           <a:p>
             <a:pPr lvl="1"/>
             <a:r>
-              <a:rPr lang="en-US" dirty="0" smtClean="0"/>
+              <a:rPr lang="en-US" dirty="0"/>
               <a:t>Visualizations</a:t>
             </a:r>
-            <a:endParaRPr lang="en-US" dirty="0"/>
           </a:p>
           <a:p>
             <a:pPr lvl="1"/>
             <a:r>
-              <a:rPr lang="en-US" dirty="0" smtClean="0"/>
+              <a:rPr lang="en-US" dirty="0"/>
               <a:t>Aggregations</a:t>
             </a:r>
-            <a:endParaRPr lang="en-US" dirty="0"/>
           </a:p>
           <a:p>
             <a:pPr lvl="1"/>
             <a:r>
-              <a:rPr lang="en-US" dirty="0" smtClean="0"/>
+              <a:rPr lang="en-US" dirty="0"/>
               <a:t>Machine learning coming soon!</a:t>
             </a:r>
           </a:p>
@@ -7305,7 +7219,7 @@
           </a:p>
           <a:p>
             <a:r>
-              <a:rPr lang="en-US" dirty="0" smtClean="0"/>
+              <a:rPr lang="en-US" dirty="0"/>
               <a:t>Multi-tenancy</a:t>
             </a:r>
           </a:p>
@@ -7315,10 +7229,9 @@
           </a:p>
           <a:p>
             <a:r>
-              <a:rPr lang="en-US" dirty="0" smtClean="0"/>
+              <a:rPr lang="en-US" dirty="0"/>
               <a:t>General purpose document store </a:t>
             </a:r>
-            <a:endParaRPr lang="en-US" dirty="0" smtClean="0"/>
           </a:p>
           <a:p>
             <a:pPr lvl="1"/>
@@ -7372,13 +7285,6 @@
   <p:clrMapOvr>
     <a:masterClrMapping/>
   </p:clrMapOvr>
-  <p:timing>
-    <p:tnLst>
-      <p:par>
-        <p:cTn id="1" dur="indefinite" restart="never" nodeType="tmRoot"/>
-      </p:par>
-    </p:tnLst>
-  </p:timing>
 </p:sld>
 </file>
 
@@ -7415,56 +7321,54 @@
           <a:lstStyle/>
           <a:p>
             <a:r>
-              <a:rPr lang="en-US" dirty="0" smtClean="0"/>
+              <a:rPr lang="en-US" dirty="0"/>
               <a:t>Notable Users</a:t>
             </a:r>
+          </a:p>
+        </p:txBody>
+      </p:sp>
+      <p:sp>
+        <p:nvSpPr>
+          <p:cNvPr id="3" name="Content Placeholder 2"/>
+          <p:cNvSpPr>
+            <a:spLocks noGrp="1"/>
+          </p:cNvSpPr>
+          <p:nvPr>
+            <p:ph sz="quarter" idx="1"/>
+          </p:nvPr>
+        </p:nvSpPr>
+        <p:spPr/>
+        <p:txBody>
+          <a:bodyPr/>
+          <a:lstStyle/>
+          <a:p>
+            <a:r>
+              <a:rPr lang="en-US" dirty="0"/>
+              <a:t>The New York Times</a:t>
+            </a:r>
+          </a:p>
+          <a:p>
+            <a:pPr lvl="1"/>
+            <a:r>
+              <a:rPr lang="en-US" dirty="0"/>
+              <a:t>Search for 164 years of published articles</a:t>
+            </a:r>
+          </a:p>
+          <a:p>
             <a:endParaRPr lang="en-US" dirty="0"/>
           </a:p>
-        </p:txBody>
-      </p:sp>
-      <p:sp>
-        <p:nvSpPr>
-          <p:cNvPr id="3" name="Content Placeholder 2"/>
-          <p:cNvSpPr>
-            <a:spLocks noGrp="1"/>
-          </p:cNvSpPr>
-          <p:nvPr>
-            <p:ph sz="quarter" idx="1"/>
-          </p:nvPr>
-        </p:nvSpPr>
-        <p:spPr/>
-        <p:txBody>
-          <a:bodyPr/>
-          <a:lstStyle/>
-          <a:p>
-            <a:r>
-              <a:rPr lang="en-US" dirty="0" smtClean="0"/>
-              <a:t>The New York Times</a:t>
+          <a:p>
+            <a:r>
+              <a:rPr lang="en-US" dirty="0"/>
+              <a:t>Microsoft</a:t>
             </a:r>
           </a:p>
           <a:p>
             <a:pPr lvl="1"/>
             <a:r>
-              <a:rPr lang="en-US" dirty="0" smtClean="0"/>
-              <a:t>Search for 164 years of published articles</a:t>
-            </a:r>
-          </a:p>
-          <a:p>
-            <a:endParaRPr lang="en-US" dirty="0"/>
-          </a:p>
-          <a:p>
-            <a:r>
-              <a:rPr lang="en-US" dirty="0" smtClean="0"/>
-              <a:t>Microsoft</a:t>
-            </a:r>
-          </a:p>
-          <a:p>
-            <a:pPr lvl="1"/>
-            <a:r>
-              <a:rPr lang="en-US" dirty="0" smtClean="0"/>
+              <a:rPr lang="en-US" dirty="0"/>
               <a:t>Search on Azure and powering Social Dynamics</a:t>
             </a:r>
-            <a:endParaRPr lang="en-US" dirty="0"/>
           </a:p>
           <a:p>
             <a:pPr marL="0" indent="0">
@@ -7474,14 +7378,14 @@
           </a:p>
           <a:p>
             <a:r>
-              <a:rPr lang="en-US" dirty="0" smtClean="0"/>
+              <a:rPr lang="en-US" dirty="0"/>
               <a:t>GitHub</a:t>
             </a:r>
           </a:p>
           <a:p>
             <a:pPr lvl="1"/>
             <a:r>
-              <a:rPr lang="en-US" dirty="0" smtClean="0"/>
+              <a:rPr lang="en-US" dirty="0"/>
               <a:t>Search in GitHub</a:t>
             </a:r>
           </a:p>
@@ -7491,25 +7395,24 @@
           </a:p>
           <a:p>
             <a:r>
-              <a:rPr lang="en-US" dirty="0" smtClean="0"/>
+              <a:rPr lang="en-US" dirty="0"/>
               <a:t>IBM</a:t>
             </a:r>
           </a:p>
           <a:p>
             <a:pPr lvl="1"/>
             <a:r>
-              <a:rPr lang="en-US" dirty="0" smtClean="0"/>
+              <a:rPr lang="en-US" dirty="0"/>
               <a:t>Operational log analysis engine for </a:t>
             </a:r>
             <a:r>
-              <a:rPr lang="en-US" dirty="0" err="1" smtClean="0"/>
+              <a:rPr lang="en-US" dirty="0" err="1"/>
               <a:t>Bluemix</a:t>
             </a:r>
             <a:r>
-              <a:rPr lang="en-US" dirty="0" smtClean="0"/>
+              <a:rPr lang="en-US" dirty="0"/>
               <a:t> Apps</a:t>
             </a:r>
-            <a:endParaRPr lang="en-US" dirty="0"/>
           </a:p>
         </p:txBody>
       </p:sp>
@@ -7545,7 +7448,6 @@
               <a:rPr lang="en-US" dirty="0"/>
               <a:t>.</a:t>
             </a:r>
-            <a:endParaRPr lang="en-US" dirty="0"/>
           </a:p>
         </p:txBody>
       </p:sp>
@@ -7559,13 +7461,6 @@
   <p:clrMapOvr>
     <a:masterClrMapping/>
   </p:clrMapOvr>
-  <p:timing>
-    <p:tnLst>
-      <p:par>
-        <p:cTn id="1" dur="indefinite" restart="never" nodeType="tmRoot"/>
-      </p:par>
-    </p:tnLst>
-  </p:timing>
 </p:sld>
 </file>
 
@@ -7602,11 +7497,11 @@
           <a:lstStyle/>
           <a:p>
             <a:r>
-              <a:rPr lang="en-US" dirty="0" smtClean="0"/>
+              <a:rPr lang="en-US" dirty="0"/>
               <a:t>Install </a:t>
             </a:r>
             <a:r>
-              <a:rPr lang="en-US" dirty="0" err="1" smtClean="0"/>
+              <a:rPr lang="en-US" dirty="0" err="1"/>
               <a:t>Elasticsearch</a:t>
             </a:r>
             <a:endParaRPr lang="en-US" dirty="0"/>
@@ -7640,7 +7535,7 @@
               <a:buAutoNum type="arabicPeriod"/>
             </a:pPr>
             <a:r>
-              <a:rPr lang="en-US" dirty="0" smtClean="0"/>
+              <a:rPr lang="en-US" dirty="0"/>
               <a:t>Install or check for Java 7 or higher</a:t>
             </a:r>
           </a:p>
@@ -7657,14 +7552,14 @@
               <a:buAutoNum type="arabicPeriod"/>
             </a:pPr>
             <a:r>
-              <a:rPr lang="en-US" dirty="0" smtClean="0"/>
+              <a:rPr lang="en-US" dirty="0"/>
               <a:t>Download </a:t>
             </a:r>
             <a:r>
-              <a:rPr lang="en-US" dirty="0" err="1" smtClean="0"/>
+              <a:rPr lang="en-US" dirty="0" err="1"/>
               <a:t>Elasticsearch</a:t>
             </a:r>
-            <a:endParaRPr lang="en-US" dirty="0" smtClean="0"/>
+            <a:endParaRPr lang="en-US" dirty="0"/>
           </a:p>
           <a:p>
             <a:pPr lvl="1"/>
@@ -7672,15 +7567,9 @@
               <a:rPr lang="en-US" dirty="0">
                 <a:hlinkClick r:id="rId2"/>
               </a:rPr>
-              <a:t>https://</a:t>
-            </a:r>
-            <a:r>
-              <a:rPr lang="en-US" dirty="0" smtClean="0">
-                <a:hlinkClick r:id="rId2"/>
-              </a:rPr>
-              <a:t>www.elastic.co/downloads/elasticsearch</a:t>
-            </a:r>
-            <a:endParaRPr lang="en-US" dirty="0" smtClean="0"/>
+              <a:t>https://www.elastic.co/downloads/elasticsearch</a:t>
+            </a:r>
+            <a:endParaRPr lang="en-US" dirty="0"/>
           </a:p>
           <a:p>
             <a:pPr marL="457200" indent="-457200">
@@ -7695,18 +7584,18 @@
               <a:buAutoNum type="arabicPeriod"/>
             </a:pPr>
             <a:r>
-              <a:rPr lang="en-US" dirty="0" smtClean="0"/>
+              <a:rPr lang="en-US" dirty="0"/>
               <a:t>Extract file to preferred path</a:t>
             </a:r>
           </a:p>
           <a:p>
             <a:pPr lvl="1"/>
             <a:r>
-              <a:rPr lang="en-US" dirty="0" err="1" smtClean="0"/>
+              <a:rPr lang="en-US" dirty="0" err="1"/>
               <a:t>Elasticsearch</a:t>
             </a:r>
             <a:r>
-              <a:rPr lang="en-US" dirty="0" smtClean="0"/>
+              <a:rPr lang="en-US" dirty="0"/>
               <a:t> is now installed there</a:t>
             </a:r>
           </a:p>
@@ -7758,13 +7647,6 @@
   <p:clrMapOvr>
     <a:masterClrMapping/>
   </p:clrMapOvr>
-  <p:timing>
-    <p:tnLst>
-      <p:par>
-        <p:cTn id="1" dur="indefinite" restart="never" nodeType="tmRoot"/>
-      </p:par>
-    </p:tnLst>
-  </p:timing>
 </p:sld>
 </file>
 
@@ -7801,11 +7683,11 @@
           <a:lstStyle/>
           <a:p>
             <a:r>
-              <a:rPr lang="en-US" dirty="0" smtClean="0"/>
+              <a:rPr lang="en-US" dirty="0"/>
               <a:t>Run </a:t>
             </a:r>
             <a:r>
-              <a:rPr lang="en-US" dirty="0" err="1" smtClean="0"/>
+              <a:rPr lang="en-US" dirty="0" err="1"/>
               <a:t>Elasticsearch</a:t>
             </a:r>
             <a:endParaRPr lang="en-US" dirty="0"/>
@@ -7888,84 +7770,83 @@
               <a:t> </a:t>
             </a:r>
             <a:r>
-              <a:rPr lang="en-US" dirty="0" smtClean="0"/>
+              <a:rPr lang="en-US" dirty="0"/>
               <a:t>command</a:t>
             </a:r>
           </a:p>
           <a:p>
             <a:pPr lvl="1"/>
             <a:r>
-              <a:rPr lang="en-US" dirty="0" smtClean="0"/>
+              <a:rPr lang="en-US" dirty="0"/>
               <a:t>If </a:t>
             </a:r>
             <a:r>
-              <a:rPr lang="en-US" b="1" dirty="0" smtClean="0"/>
+              <a:rPr lang="en-US" b="1" dirty="0"/>
               <a:t>could not reserve enough space for KB object heap</a:t>
             </a:r>
             <a:r>
-              <a:rPr lang="en-US" dirty="0" smtClean="0"/>
+              <a:rPr lang="en-US" dirty="0"/>
               <a:t>,</a:t>
             </a:r>
           </a:p>
           <a:p>
             <a:pPr lvl="2"/>
             <a:r>
-              <a:rPr lang="en-US" dirty="0" smtClean="0"/>
+              <a:rPr lang="en-US" dirty="0"/>
               <a:t> add </a:t>
             </a:r>
             <a:r>
-              <a:rPr lang="en-US" b="1" dirty="0" smtClean="0"/>
+              <a:rPr lang="en-US" b="1" dirty="0"/>
               <a:t>_</a:t>
             </a:r>
             <a:r>
-              <a:rPr lang="en-US" b="1" dirty="0" err="1" smtClean="0"/>
+              <a:rPr lang="en-US" b="1" dirty="0" err="1"/>
               <a:t>Java_Options</a:t>
             </a:r>
             <a:r>
-              <a:rPr lang="en-US" b="1" dirty="0" smtClean="0"/>
+              <a:rPr lang="en-US" b="1" dirty="0"/>
               <a:t>_ </a:t>
             </a:r>
             <a:r>
-              <a:rPr lang="en-US" dirty="0" smtClean="0"/>
+              <a:rPr lang="en-US" dirty="0"/>
               <a:t>with value </a:t>
             </a:r>
             <a:r>
-              <a:rPr lang="en-US" b="1" dirty="0" smtClean="0"/>
+              <a:rPr lang="en-US" b="1" dirty="0"/>
               <a:t>–Xmx512M –Xms256M</a:t>
             </a:r>
             <a:r>
-              <a:rPr lang="en-US" dirty="0" smtClean="0"/>
+              <a:rPr lang="en-US" dirty="0"/>
               <a:t> to system path</a:t>
             </a:r>
-            <a:endParaRPr lang="en-US" dirty="0"/>
           </a:p>
           <a:p>
             <a:pPr lvl="1"/>
             <a:r>
-              <a:rPr lang="en-US" dirty="0" smtClean="0"/>
+              <a:rPr lang="en-US" dirty="0"/>
               <a:t> If </a:t>
             </a:r>
             <a:r>
-              <a:rPr lang="en-US" b="1" dirty="0" smtClean="0"/>
+              <a:rPr lang="en-US" b="1" dirty="0"/>
               <a:t>JAVA_HOME is not set</a:t>
             </a:r>
             <a:r>
-              <a:rPr lang="en-US" dirty="0" smtClean="0"/>
+              <a:rPr lang="en-US" dirty="0"/>
               <a:t>,</a:t>
             </a:r>
           </a:p>
           <a:p>
             <a:pPr lvl="2"/>
             <a:r>
-              <a:rPr lang="en-US" dirty="0" smtClean="0"/>
+              <a:rPr lang="en-US" dirty="0"/>
               <a:t>add </a:t>
             </a:r>
             <a:r>
-              <a:rPr lang="en-US" b="1" dirty="0" smtClean="0"/>
+              <a:rPr lang="en-US" b="1" dirty="0"/>
               <a:t>JAVA_HOME</a:t>
             </a:r>
             <a:r>
-              <a:rPr lang="en-US" dirty="0" smtClean="0"/>
+              <a:rPr lang="en-US" dirty="0"/>
               <a:t> with value path to your Java JDK to system path</a:t>
             </a:r>
           </a:p>
@@ -7986,19 +7867,12 @@
               <a:rPr lang="en-US" dirty="0">
                 <a:hlinkClick r:id="rId2"/>
               </a:rPr>
-              <a:t>http://localhost:9200</a:t>
-            </a:r>
-            <a:r>
-              <a:rPr lang="en-US" dirty="0" smtClean="0">
-                <a:hlinkClick r:id="rId2"/>
-              </a:rPr>
-              <a:t>/</a:t>
-            </a:r>
-            <a:r>
-              <a:rPr lang="en-US" dirty="0" smtClean="0"/>
+              <a:t>http://localhost:9200/</a:t>
+            </a:r>
+            <a:r>
+              <a:rPr lang="en-US" dirty="0"/>
               <a:t> to check if the server is running</a:t>
             </a:r>
-            <a:endParaRPr lang="en-US" dirty="0"/>
           </a:p>
           <a:p>
             <a:pPr marL="457200" indent="-457200">
@@ -8054,13 +7928,6 @@
   <p:clrMapOvr>
     <a:masterClrMapping/>
   </p:clrMapOvr>
-  <p:timing>
-    <p:tnLst>
-      <p:par>
-        <p:cTn id="1" dur="indefinite" restart="never" nodeType="tmRoot"/>
-      </p:par>
-    </p:tnLst>
-  </p:timing>
 </p:sld>
 </file>
 
@@ -8097,10 +7964,9 @@
           <a:lstStyle/>
           <a:p>
             <a:r>
-              <a:rPr lang="en-US" dirty="0" smtClean="0"/>
+              <a:rPr lang="en-US" dirty="0"/>
               <a:t>Install HTTP Client</a:t>
             </a:r>
-            <a:endParaRPr lang="en-US" dirty="0"/>
           </a:p>
         </p:txBody>
       </p:sp>
@@ -8120,42 +7986,42 @@
           <a:lstStyle/>
           <a:p>
             <a:r>
-              <a:rPr lang="en-US" dirty="0" smtClean="0"/>
+              <a:rPr lang="en-US" dirty="0"/>
               <a:t>Interact with </a:t>
             </a:r>
             <a:r>
-              <a:rPr lang="en-US" dirty="0" err="1" smtClean="0"/>
+              <a:rPr lang="en-US" dirty="0" err="1"/>
               <a:t>Elasticsearch’s</a:t>
             </a:r>
             <a:r>
-              <a:rPr lang="en-US" dirty="0" smtClean="0"/>
+              <a:rPr lang="en-US" dirty="0"/>
               <a:t> JSON base REST API using an HTTP Client (curl, Sense, </a:t>
             </a:r>
             <a:r>
-              <a:rPr lang="en-US" dirty="0" err="1" smtClean="0"/>
+              <a:rPr lang="en-US" dirty="0" err="1"/>
               <a:t>RESTClient</a:t>
             </a:r>
             <a:r>
-              <a:rPr lang="en-US" dirty="0" smtClean="0"/>
+              <a:rPr lang="en-US" dirty="0"/>
               <a:t>, </a:t>
             </a:r>
             <a:r>
-              <a:rPr lang="en-US" dirty="0" err="1" smtClean="0"/>
+              <a:rPr lang="en-US" dirty="0" err="1"/>
               <a:t>Kibana</a:t>
             </a:r>
             <a:r>
-              <a:rPr lang="en-US" dirty="0" smtClean="0"/>
+              <a:rPr lang="en-US" dirty="0"/>
               <a:t>)</a:t>
             </a:r>
           </a:p>
           <a:p>
             <a:pPr lvl="1"/>
             <a:r>
-              <a:rPr lang="en-US" dirty="0" smtClean="0"/>
+              <a:rPr lang="en-US" dirty="0"/>
               <a:t>The following examples will be done using </a:t>
             </a:r>
             <a:r>
-              <a:rPr lang="en-US" b="1" dirty="0" smtClean="0"/>
+              <a:rPr lang="en-US" b="1" dirty="0"/>
               <a:t>Fiddler</a:t>
             </a:r>
           </a:p>
@@ -8168,39 +8034,32 @@
               <a:rPr lang="en-US" dirty="0">
                 <a:hlinkClick r:id="rId2"/>
               </a:rPr>
-              <a:t>https://</a:t>
-            </a:r>
-            <a:r>
-              <a:rPr lang="en-US" dirty="0" smtClean="0">
-                <a:hlinkClick r:id="rId2"/>
-              </a:rPr>
-              <a:t>www.telerik.com/download/fiddler</a:t>
-            </a:r>
-            <a:endParaRPr lang="en-US" dirty="0" smtClean="0"/>
-          </a:p>
-          <a:p>
+              <a:t>https://www.telerik.com/download/fiddler</a:t>
+            </a:r>
             <a:endParaRPr lang="en-US" dirty="0"/>
           </a:p>
           <a:p>
-            <a:r>
-              <a:rPr lang="en-US" dirty="0" smtClean="0"/>
+            <a:endParaRPr lang="en-US" dirty="0"/>
+          </a:p>
+          <a:p>
+            <a:r>
+              <a:rPr lang="en-US" dirty="0"/>
               <a:t>Installation of Fiddler is simple in Windows</a:t>
             </a:r>
           </a:p>
           <a:p>
             <a:pPr lvl="1"/>
             <a:r>
-              <a:rPr lang="en-US" dirty="0" smtClean="0"/>
+              <a:rPr lang="en-US" dirty="0"/>
               <a:t>Double click on the downloaded EXE</a:t>
             </a:r>
           </a:p>
           <a:p>
             <a:pPr lvl="1"/>
             <a:r>
-              <a:rPr lang="en-US" dirty="0" smtClean="0"/>
+              <a:rPr lang="en-US" dirty="0"/>
               <a:t>Follow the Launcher steps for installation</a:t>
             </a:r>
-            <a:endParaRPr lang="en-US" dirty="0"/>
           </a:p>
         </p:txBody>
       </p:sp>
@@ -8214,13 +8073,6 @@
   <p:clrMapOvr>
     <a:masterClrMapping/>
   </p:clrMapOvr>
-  <p:timing>
-    <p:tnLst>
-      <p:par>
-        <p:cTn id="1" dur="indefinite" restart="never" nodeType="tmRoot"/>
-      </p:par>
-    </p:tnLst>
-  </p:timing>
 </p:sld>
 </file>
 

</xml_diff>